<commit_message>
The Flask Server now works and the mobile app sends and recives data from it.
Updates
</commit_message>
<xml_diff>
--- a/Stock Control UI.pptx
+++ b/Stock Control UI.pptx
@@ -6137,8 +6137,8 @@
         </p:nvSpPr>
         <p:spPr bwMode="auto">
           <a:xfrm flipH="0" flipV="0">
-            <a:off x="1092160" y="1368640"/>
-            <a:ext cx="1263527" cy="366119"/>
+            <a:off x="1092159" y="1368639"/>
+            <a:ext cx="1606538" cy="366119"/>
           </a:xfrm>
           <a:prstGeom prst="rect">
             <a:avLst/>
@@ -6155,7 +6155,7 @@
             </a:pPr>
             <a:r>
               <a:rPr/>
-              <a:t>RLS Stock</a:t>
+              <a:t>Stock Control</a:t>
             </a:r>
             <a:endParaRPr/>
           </a:p>
@@ -6742,8 +6742,8 @@
         </p:nvSpPr>
         <p:spPr bwMode="auto">
           <a:xfrm flipH="0" flipV="0">
-            <a:off x="4320486" y="1369158"/>
-            <a:ext cx="1263527" cy="366119"/>
+            <a:off x="4320486" y="1369157"/>
+            <a:ext cx="1606538" cy="366119"/>
           </a:xfrm>
           <a:prstGeom prst="rect">
             <a:avLst/>
@@ -6760,7 +6760,7 @@
             </a:pPr>
             <a:r>
               <a:rPr/>
-              <a:t>RLS Stock</a:t>
+              <a:t>Stock Control</a:t>
             </a:r>
             <a:endParaRPr/>
           </a:p>
@@ -7215,8 +7215,8 @@
         </p:nvSpPr>
         <p:spPr bwMode="auto">
           <a:xfrm flipH="0" flipV="0">
-            <a:off x="7280471" y="1369676"/>
-            <a:ext cx="1263527" cy="366119"/>
+            <a:off x="7280470" y="1369675"/>
+            <a:ext cx="1606538" cy="640440"/>
           </a:xfrm>
           <a:prstGeom prst="rect">
             <a:avLst/>
@@ -7232,9 +7232,22 @@
               <a:defRPr/>
             </a:pPr>
             <a:r>
-              <a:rPr/>
-              <a:t>RLS Stock</a:t>
+              <a:rPr lang="en-US" sz="1800" b="0" i="0" u="none" strike="noStrike" cap="none" spc="0">
+                <a:solidFill>
+                  <a:schemeClr val="tx1"/>
+                </a:solidFill>
+                <a:latin typeface="+mn-lt"/>
+                <a:ea typeface="+mn-ea"/>
+                <a:cs typeface="+mn-cs"/>
+              </a:rPr>
+              <a:t>Stock Control</a:t>
             </a:r>
+            <a:endParaRPr sz="1800"/>
+          </a:p>
+          <a:p>
+            <a:pPr>
+              <a:defRPr/>
+            </a:pPr>
             <a:endParaRPr/>
           </a:p>
         </p:txBody>
@@ -7567,114 +7580,6 @@
       </p:sp>
       <p:sp>
         <p:nvSpPr>
-          <p:cNvPr id="187114005" name=""/>
-          <p:cNvSpPr/>
-          <p:nvPr/>
-        </p:nvSpPr>
-        <p:spPr bwMode="auto">
-          <a:xfrm flipH="0" flipV="0">
-            <a:off x="3666355" y="1194660"/>
-            <a:ext cx="2050533" cy="5308738"/>
-          </a:xfrm>
-          <a:prstGeom prst="rect">
-            <a:avLst/>
-          </a:prstGeom>
-          <a:solidFill>
-            <a:schemeClr val="bg1">
-              <a:lumMod val="95000"/>
-            </a:schemeClr>
-          </a:solidFill>
-          <a:ln w="12699" cap="flat" cmpd="sng" algn="ctr">
-            <a:solidFill>
-              <a:schemeClr val="tx1"/>
-            </a:solidFill>
-            <a:prstDash val="solid"/>
-            <a:miter lim="800000"/>
-          </a:ln>
-        </p:spPr>
-        <p:style>
-          <a:lnRef idx="2">
-            <a:schemeClr val="accent1">
-              <a:shade val="50000"/>
-            </a:schemeClr>
-          </a:lnRef>
-          <a:fillRef idx="1">
-            <a:schemeClr val="accent1"/>
-          </a:fillRef>
-          <a:effectRef idx="0">
-            <a:schemeClr val="accent1"/>
-          </a:effectRef>
-          <a:fontRef idx="minor">
-            <a:schemeClr val="lt1"/>
-          </a:fontRef>
-        </p:style>
-      </p:sp>
-      <p:sp>
-        <p:nvSpPr>
-          <p:cNvPr id="1571646908" name=""/>
-          <p:cNvSpPr txBox="1"/>
-          <p:nvPr/>
-        </p:nvSpPr>
-        <p:spPr bwMode="auto">
-          <a:xfrm flipH="0" flipV="0">
-            <a:off x="3811869" y="1507014"/>
-            <a:ext cx="1034930" cy="1006200"/>
-          </a:xfrm>
-          <a:prstGeom prst="rect">
-            <a:avLst/>
-          </a:prstGeom>
-          <a:noFill/>
-        </p:spPr>
-        <p:txBody>
-          <a:bodyPr vertOverflow="overflow" horzOverflow="overflow" vert="horz" wrap="none" lIns="91440" tIns="45720" rIns="91440" bIns="45720" numCol="1" spcCol="0" rtlCol="0" fromWordArt="0" anchor="t" anchorCtr="0" forceAA="0" upright="0" compatLnSpc="0">
-            <a:spAutoFit/>
-          </a:bodyPr>
-          <a:p>
-            <a:pPr>
-              <a:defRPr/>
-            </a:pPr>
-            <a:r>
-              <a:rPr lang="pt-PT"/>
-              <a:t>Opções:</a:t>
-            </a:r>
-            <a:endParaRPr lang="pt-PT"/>
-          </a:p>
-          <a:p>
-            <a:pPr marL="239821" indent="-239821">
-              <a:buFont typeface="Arial"/>
-              <a:buChar char="•"/>
-              <a:defRPr/>
-            </a:pPr>
-            <a:r>
-              <a:rPr lang="pt-PT" sz="1400"/>
-              <a:t>??</a:t>
-            </a:r>
-            <a:endParaRPr lang="pt-PT" sz="1400"/>
-          </a:p>
-          <a:p>
-            <a:pPr marL="239821" indent="-239821">
-              <a:buFont typeface="Arial"/>
-              <a:buChar char="•"/>
-              <a:defRPr/>
-            </a:pPr>
-            <a:r>
-              <a:rPr lang="pt-PT" sz="1400"/>
-              <a:t>??</a:t>
-            </a:r>
-            <a:endParaRPr lang="pt-PT" sz="1400"/>
-          </a:p>
-          <a:p>
-            <a:pPr marL="239821" indent="-239821">
-              <a:buFont typeface="Arial"/>
-              <a:buChar char="•"/>
-              <a:defRPr/>
-            </a:pPr>
-            <a:endParaRPr lang="pt-PT" sz="1400"/>
-          </a:p>
-        </p:txBody>
-      </p:sp>
-      <p:sp>
-        <p:nvSpPr>
           <p:cNvPr id="558291439" name=""/>
           <p:cNvSpPr/>
           <p:nvPr/>
@@ -7896,6 +7801,114 @@
           </a:fontRef>
         </p:style>
       </p:cxnSp>
+      <p:sp>
+        <p:nvSpPr>
+          <p:cNvPr id="2102279780" name=""/>
+          <p:cNvSpPr/>
+          <p:nvPr/>
+        </p:nvSpPr>
+        <p:spPr bwMode="auto">
+          <a:xfrm flipH="0" flipV="0">
+            <a:off x="3677700" y="1194661"/>
+            <a:ext cx="2050533" cy="5308737"/>
+          </a:xfrm>
+          <a:prstGeom prst="rect">
+            <a:avLst/>
+          </a:prstGeom>
+          <a:solidFill>
+            <a:schemeClr val="bg1">
+              <a:lumMod val="95000"/>
+            </a:schemeClr>
+          </a:solidFill>
+          <a:ln w="12699" cap="flat" cmpd="sng" algn="ctr">
+            <a:solidFill>
+              <a:schemeClr val="tx1"/>
+            </a:solidFill>
+            <a:prstDash val="solid"/>
+            <a:miter lim="800000"/>
+          </a:ln>
+        </p:spPr>
+        <p:style>
+          <a:lnRef idx="2">
+            <a:schemeClr val="accent1">
+              <a:shade val="50000"/>
+            </a:schemeClr>
+          </a:lnRef>
+          <a:fillRef idx="1">
+            <a:schemeClr val="accent1"/>
+          </a:fillRef>
+          <a:effectRef idx="0">
+            <a:schemeClr val="accent1"/>
+          </a:effectRef>
+          <a:fontRef idx="minor">
+            <a:schemeClr val="lt1"/>
+          </a:fontRef>
+        </p:style>
+      </p:sp>
+      <p:sp>
+        <p:nvSpPr>
+          <p:cNvPr id="1571646908" name=""/>
+          <p:cNvSpPr txBox="1"/>
+          <p:nvPr/>
+        </p:nvSpPr>
+        <p:spPr bwMode="auto">
+          <a:xfrm flipH="0" flipV="0">
+            <a:off x="3811869" y="1507014"/>
+            <a:ext cx="1034930" cy="1006200"/>
+          </a:xfrm>
+          <a:prstGeom prst="rect">
+            <a:avLst/>
+          </a:prstGeom>
+          <a:noFill/>
+        </p:spPr>
+        <p:txBody>
+          <a:bodyPr vertOverflow="overflow" horzOverflow="overflow" vert="horz" wrap="none" lIns="91440" tIns="45720" rIns="91440" bIns="45720" numCol="1" spcCol="0" rtlCol="0" fromWordArt="0" anchor="t" anchorCtr="0" forceAA="0" upright="0" compatLnSpc="0">
+            <a:spAutoFit/>
+          </a:bodyPr>
+          <a:p>
+            <a:pPr>
+              <a:defRPr/>
+            </a:pPr>
+            <a:r>
+              <a:rPr lang="pt-PT"/>
+              <a:t>Opções:</a:t>
+            </a:r>
+            <a:endParaRPr lang="pt-PT"/>
+          </a:p>
+          <a:p>
+            <a:pPr marL="239821" indent="-239821">
+              <a:buFont typeface="Arial"/>
+              <a:buChar char="•"/>
+              <a:defRPr/>
+            </a:pPr>
+            <a:r>
+              <a:rPr lang="pt-PT" sz="1400"/>
+              <a:t>??</a:t>
+            </a:r>
+            <a:endParaRPr lang="pt-PT" sz="1400"/>
+          </a:p>
+          <a:p>
+            <a:pPr marL="239821" indent="-239821">
+              <a:buFont typeface="Arial"/>
+              <a:buChar char="•"/>
+              <a:defRPr/>
+            </a:pPr>
+            <a:r>
+              <a:rPr lang="pt-PT" sz="1400"/>
+              <a:t>??</a:t>
+            </a:r>
+            <a:endParaRPr lang="pt-PT" sz="1400"/>
+          </a:p>
+          <a:p>
+            <a:pPr marL="239821" indent="-239821">
+              <a:buFont typeface="Arial"/>
+              <a:buChar char="•"/>
+              <a:defRPr/>
+            </a:pPr>
+            <a:endParaRPr lang="pt-PT" sz="1400"/>
+          </a:p>
+        </p:txBody>
+      </p:sp>
       <p:cxnSp>
         <p:nvCxnSpPr>
           <p:cNvPr id="0" name=""/>
@@ -10972,7 +10985,7 @@
               <p:nvPr/>
             </p:nvSpPr>
             <p:spPr bwMode="auto">
-              <a:xfrm rot="16199933" flipH="0" flipV="0">
+              <a:xfrm rot="16199932" flipH="0" flipV="0">
                 <a:off x="409906" y="1112665"/>
                 <a:ext cx="246723" cy="212692"/>
               </a:xfrm>
@@ -15857,7 +15870,7 @@
               <p:nvPr/>
             </p:nvSpPr>
             <p:spPr bwMode="auto">
-              <a:xfrm rot="16199933" flipH="0" flipV="0">
+              <a:xfrm rot="16199932" flipH="0" flipV="0">
                 <a:off x="409906" y="1112665"/>
                 <a:ext cx="246723" cy="212692"/>
               </a:xfrm>

</xml_diff>